<commit_message>
Updated documentation, depiction, and YAML based on GitHub discussion
</commit_message>
<xml_diff>
--- a/API/0.9.0/ReasonerStdAPI_0.8.0to0.9.0.pptx
+++ b/API/0.9.0/ReasonerStdAPI_0.8.0to0.9.0.pptx
@@ -250,7 +250,7 @@
           <a:p>
             <a:fld id="{F6552F34-C226-498A-A7EE-41D35469B7AE}" type="datetimeFigureOut">
               <a:rPr lang="en-US" smtClean="0"/>
-              <a:t>11/12/2018</a:t>
+              <a:t>11/14/2018</a:t>
             </a:fld>
             <a:endParaRPr lang="en-US"/>
           </a:p>
@@ -418,7 +418,7 @@
           <a:p>
             <a:fld id="{F6552F34-C226-498A-A7EE-41D35469B7AE}" type="datetimeFigureOut">
               <a:rPr lang="en-US" smtClean="0"/>
-              <a:t>11/12/2018</a:t>
+              <a:t>11/14/2018</a:t>
             </a:fld>
             <a:endParaRPr lang="en-US"/>
           </a:p>
@@ -596,7 +596,7 @@
           <a:p>
             <a:fld id="{F6552F34-C226-498A-A7EE-41D35469B7AE}" type="datetimeFigureOut">
               <a:rPr lang="en-US" smtClean="0"/>
-              <a:t>11/12/2018</a:t>
+              <a:t>11/14/2018</a:t>
             </a:fld>
             <a:endParaRPr lang="en-US"/>
           </a:p>
@@ -764,7 +764,7 @@
           <a:p>
             <a:fld id="{F6552F34-C226-498A-A7EE-41D35469B7AE}" type="datetimeFigureOut">
               <a:rPr lang="en-US" smtClean="0"/>
-              <a:t>11/12/2018</a:t>
+              <a:t>11/14/2018</a:t>
             </a:fld>
             <a:endParaRPr lang="en-US"/>
           </a:p>
@@ -1009,7 +1009,7 @@
           <a:p>
             <a:fld id="{F6552F34-C226-498A-A7EE-41D35469B7AE}" type="datetimeFigureOut">
               <a:rPr lang="en-US" smtClean="0"/>
-              <a:t>11/12/2018</a:t>
+              <a:t>11/14/2018</a:t>
             </a:fld>
             <a:endParaRPr lang="en-US"/>
           </a:p>
@@ -1238,7 +1238,7 @@
           <a:p>
             <a:fld id="{F6552F34-C226-498A-A7EE-41D35469B7AE}" type="datetimeFigureOut">
               <a:rPr lang="en-US" smtClean="0"/>
-              <a:t>11/12/2018</a:t>
+              <a:t>11/14/2018</a:t>
             </a:fld>
             <a:endParaRPr lang="en-US"/>
           </a:p>
@@ -1602,7 +1602,7 @@
           <a:p>
             <a:fld id="{F6552F34-C226-498A-A7EE-41D35469B7AE}" type="datetimeFigureOut">
               <a:rPr lang="en-US" smtClean="0"/>
-              <a:t>11/12/2018</a:t>
+              <a:t>11/14/2018</a:t>
             </a:fld>
             <a:endParaRPr lang="en-US"/>
           </a:p>
@@ -1719,7 +1719,7 @@
           <a:p>
             <a:fld id="{F6552F34-C226-498A-A7EE-41D35469B7AE}" type="datetimeFigureOut">
               <a:rPr lang="en-US" smtClean="0"/>
-              <a:t>11/12/2018</a:t>
+              <a:t>11/14/2018</a:t>
             </a:fld>
             <a:endParaRPr lang="en-US"/>
           </a:p>
@@ -1814,7 +1814,7 @@
           <a:p>
             <a:fld id="{F6552F34-C226-498A-A7EE-41D35469B7AE}" type="datetimeFigureOut">
               <a:rPr lang="en-US" smtClean="0"/>
-              <a:t>11/12/2018</a:t>
+              <a:t>11/14/2018</a:t>
             </a:fld>
             <a:endParaRPr lang="en-US"/>
           </a:p>
@@ -2089,7 +2089,7 @@
           <a:p>
             <a:fld id="{F6552F34-C226-498A-A7EE-41D35469B7AE}" type="datetimeFigureOut">
               <a:rPr lang="en-US" smtClean="0"/>
-              <a:t>11/12/2018</a:t>
+              <a:t>11/14/2018</a:t>
             </a:fld>
             <a:endParaRPr lang="en-US"/>
           </a:p>
@@ -2341,7 +2341,7 @@
           <a:p>
             <a:fld id="{F6552F34-C226-498A-A7EE-41D35469B7AE}" type="datetimeFigureOut">
               <a:rPr lang="en-US" smtClean="0"/>
-              <a:t>11/12/2018</a:t>
+              <a:t>11/14/2018</a:t>
             </a:fld>
             <a:endParaRPr lang="en-US"/>
           </a:p>
@@ -2552,7 +2552,7 @@
           <a:p>
             <a:fld id="{F6552F34-C226-498A-A7EE-41D35469B7AE}" type="datetimeFigureOut">
               <a:rPr lang="en-US" smtClean="0"/>
-              <a:t>11/12/2018</a:t>
+              <a:t>11/14/2018</a:t>
             </a:fld>
             <a:endParaRPr lang="en-US"/>
           </a:p>
@@ -3041,7 +3041,10 @@
             <a:avLst/>
           </a:prstGeom>
           <a:solidFill>
-            <a:srgbClr val="00B050"/>
+            <a:schemeClr val="accent5">
+              <a:lumMod val="60000"/>
+              <a:lumOff val="40000"/>
+            </a:schemeClr>
           </a:solidFill>
         </p:spPr>
         <p:style>
@@ -3066,8 +3069,8 @@
           <a:p>
             <a:pPr algn="ctr"/>
             <a:r>
-              <a:rPr lang="en-US"/>
-              <a:t>knowledge_graph {}</a:t>
+              <a:rPr lang="en-US" dirty="0" err="1" smtClean="0"/>
+              <a:t>KnowledgeGraph</a:t>
             </a:r>
             <a:endParaRPr lang="en-US" dirty="0"/>
           </a:p>
@@ -6949,12 +6952,16 @@
           <a:lstStyle/>
           <a:p>
             <a:r>
-              <a:rPr lang="en-US" sz="3200" b="1">
+              <a:rPr lang="en-US" sz="3200" b="1" dirty="0" smtClean="0">
                 <a:latin typeface="Arial" panose="020B0604020202020204" pitchFamily="34" charset="0"/>
                 <a:cs typeface="Arial" panose="020B0604020202020204" pitchFamily="34" charset="0"/>
               </a:rPr>
-              <a:t>0.9.0 ??</a:t>
-            </a:r>
+              <a:t>0.9.0</a:t>
+            </a:r>
+            <a:endParaRPr lang="en-US" sz="3200" b="1" dirty="0">
+              <a:latin typeface="Arial" panose="020B0604020202020204" pitchFamily="34" charset="0"/>
+              <a:cs typeface="Arial" panose="020B0604020202020204" pitchFamily="34" charset="0"/>
+            </a:endParaRPr>
           </a:p>
         </p:txBody>
       </p:sp>
@@ -15526,12 +15533,16 @@
           <a:lstStyle/>
           <a:p>
             <a:r>
-              <a:rPr lang="en-US" sz="3200" b="1">
+              <a:rPr lang="en-US" sz="3200" b="1" dirty="0" smtClean="0">
                 <a:latin typeface="Arial" panose="020B0604020202020204" pitchFamily="34" charset="0"/>
                 <a:cs typeface="Arial" panose="020B0604020202020204" pitchFamily="34" charset="0"/>
               </a:rPr>
-              <a:t>0.9.0 ??</a:t>
-            </a:r>
+              <a:t>0.9.0</a:t>
+            </a:r>
+            <a:endParaRPr lang="en-US" sz="3200" b="1" dirty="0">
+              <a:latin typeface="Arial" panose="020B0604020202020204" pitchFamily="34" charset="0"/>
+              <a:cs typeface="Arial" panose="020B0604020202020204" pitchFamily="34" charset="0"/>
+            </a:endParaRPr>
           </a:p>
         </p:txBody>
       </p:sp>
@@ -16041,8 +16052,8 @@
         </p:nvCxnSpPr>
         <p:spPr>
           <a:xfrm flipH="1">
-            <a:off x="6346443" y="4233933"/>
-            <a:ext cx="1127765" cy="698522"/>
+            <a:off x="6346444" y="4233933"/>
+            <a:ext cx="1127764" cy="698522"/>
           </a:xfrm>
           <a:prstGeom prst="line">
             <a:avLst/>
@@ -16081,8 +16092,8 @@
         </p:nvCxnSpPr>
         <p:spPr>
           <a:xfrm flipH="1">
-            <a:off x="6346443" y="4614750"/>
-            <a:ext cx="1127765" cy="317705"/>
+            <a:off x="6346444" y="4614750"/>
+            <a:ext cx="1127764" cy="317705"/>
           </a:xfrm>
           <a:prstGeom prst="line">
             <a:avLst/>
@@ -16121,8 +16132,8 @@
         </p:nvCxnSpPr>
         <p:spPr>
           <a:xfrm flipH="1" flipV="1">
-            <a:off x="6346443" y="4932455"/>
-            <a:ext cx="1127765" cy="63112"/>
+            <a:off x="6346444" y="4932455"/>
+            <a:ext cx="1127764" cy="63112"/>
           </a:xfrm>
           <a:prstGeom prst="line">
             <a:avLst/>
@@ -16517,8 +16528,8 @@
         </p:nvCxnSpPr>
         <p:spPr>
           <a:xfrm flipH="1" flipV="1">
-            <a:off x="6346443" y="4932455"/>
-            <a:ext cx="1127764" cy="433668"/>
+            <a:off x="6346444" y="4932455"/>
+            <a:ext cx="1127763" cy="433668"/>
           </a:xfrm>
           <a:prstGeom prst="line">
             <a:avLst/>
@@ -16988,8 +16999,8 @@
         </p:nvSpPr>
         <p:spPr>
           <a:xfrm>
-            <a:off x="4464104" y="4691450"/>
-            <a:ext cx="1882339" cy="482009"/>
+            <a:off x="3065254" y="4691450"/>
+            <a:ext cx="3281190" cy="482009"/>
           </a:xfrm>
           <a:prstGeom prst="rect">
             <a:avLst/>
@@ -17024,7 +17035,7 @@
             <a:pPr algn="ctr"/>
             <a:r>
               <a:rPr lang="en-US" dirty="0" err="1" smtClean="0"/>
-              <a:t>MessageEnvelope</a:t>
+              <a:t>PreviousMessageProcessingPlan</a:t>
             </a:r>
             <a:endParaRPr lang="en-US" dirty="0"/>
           </a:p>
@@ -17042,13 +17053,14 @@
           <p:cNvCxnSpPr>
             <a:cxnSpLocks/>
             <a:stCxn id="53" idx="1"/>
+            <a:endCxn id="260" idx="2"/>
           </p:cNvCxnSpPr>
           <p:nvPr/>
         </p:nvCxnSpPr>
         <p:spPr>
           <a:xfrm flipH="1" flipV="1">
-            <a:off x="3832698" y="4102972"/>
-            <a:ext cx="631406" cy="829483"/>
+            <a:off x="2343407" y="4102972"/>
+            <a:ext cx="721847" cy="829483"/>
           </a:xfrm>
           <a:prstGeom prst="line">
             <a:avLst/>
@@ -19337,12 +19349,16 @@
           <a:lstStyle/>
           <a:p>
             <a:r>
-              <a:rPr lang="en-US" sz="3200" b="1">
+              <a:rPr lang="en-US" sz="3200" b="1" dirty="0" smtClean="0">
                 <a:latin typeface="Arial" panose="020B0604020202020204" pitchFamily="34" charset="0"/>
                 <a:cs typeface="Arial" panose="020B0604020202020204" pitchFamily="34" charset="0"/>
               </a:rPr>
-              <a:t>0.9.0 ??</a:t>
-            </a:r>
+              <a:t>0.9.0</a:t>
+            </a:r>
+            <a:endParaRPr lang="en-US" sz="3200" b="1" dirty="0">
+              <a:latin typeface="Arial" panose="020B0604020202020204" pitchFamily="34" charset="0"/>
+              <a:cs typeface="Arial" panose="020B0604020202020204" pitchFamily="34" charset="0"/>
+            </a:endParaRPr>
           </a:p>
         </p:txBody>
       </p:sp>
@@ -19647,7 +19663,7 @@
         </p:nvSpPr>
         <p:spPr>
           <a:xfrm>
-            <a:off x="8354022" y="4421963"/>
+            <a:off x="8672866" y="4609015"/>
             <a:ext cx="535336" cy="285308"/>
           </a:xfrm>
           <a:prstGeom prst="rect">
@@ -19678,7 +19694,7 @@
           <a:lstStyle/>
           <a:p>
             <a:r>
-              <a:rPr lang="en-US"/>
+              <a:rPr lang="en-US" dirty="0" err="1"/>
               <a:t>url</a:t>
             </a:r>
             <a:endParaRPr lang="en-US" dirty="0"/>
@@ -19756,7 +19772,7 @@
         <p:spPr>
           <a:xfrm flipH="1" flipV="1">
             <a:off x="7934282" y="4265395"/>
-            <a:ext cx="419740" cy="299222"/>
+            <a:ext cx="738584" cy="486274"/>
           </a:xfrm>
           <a:prstGeom prst="line">
             <a:avLst/>
@@ -20270,7 +20286,10 @@
             <a:avLst/>
           </a:prstGeom>
           <a:solidFill>
-            <a:srgbClr val="00B050"/>
+            <a:schemeClr val="accent5">
+              <a:lumMod val="60000"/>
+              <a:lumOff val="40000"/>
+            </a:schemeClr>
           </a:solidFill>
         </p:spPr>
         <p:style>
@@ -20295,12 +20314,8 @@
           <a:p>
             <a:pPr algn="ctr"/>
             <a:r>
-              <a:rPr lang="en-US" err="1"/>
-              <a:t>query</a:t>
-            </a:r>
-            <a:r>
-              <a:rPr lang="en-US"/>
-              <a:t>_graph {}</a:t>
+              <a:rPr lang="en-US" dirty="0" err="1" smtClean="0"/>
+              <a:t>QueryGraph</a:t>
             </a:r>
             <a:endParaRPr lang="en-US" dirty="0"/>
           </a:p>
@@ -20335,12 +20350,16 @@
           <a:lstStyle/>
           <a:p>
             <a:r>
-              <a:rPr lang="en-US" sz="3200" b="1">
+              <a:rPr lang="en-US" sz="3200" b="1" dirty="0" smtClean="0">
                 <a:latin typeface="Arial" panose="020B0604020202020204" pitchFamily="34" charset="0"/>
                 <a:cs typeface="Arial" panose="020B0604020202020204" pitchFamily="34" charset="0"/>
               </a:rPr>
-              <a:t>0.9.0 ??</a:t>
-            </a:r>
+              <a:t>0.9.0</a:t>
+            </a:r>
+            <a:endParaRPr lang="en-US" sz="3200" b="1" dirty="0">
+              <a:latin typeface="Arial" panose="020B0604020202020204" pitchFamily="34" charset="0"/>
+              <a:cs typeface="Arial" panose="020B0604020202020204" pitchFamily="34" charset="0"/>
+            </a:endParaRPr>
           </a:p>
         </p:txBody>
       </p:sp>
@@ -23256,12 +23275,16 @@
           <a:lstStyle/>
           <a:p>
             <a:r>
-              <a:rPr lang="en-US" sz="3200" b="1" dirty="0">
+              <a:rPr lang="en-US" sz="3200" b="1" dirty="0" smtClean="0">
                 <a:latin typeface="Arial" panose="020B0604020202020204" pitchFamily="34" charset="0"/>
                 <a:cs typeface="Arial" panose="020B0604020202020204" pitchFamily="34" charset="0"/>
               </a:rPr>
-              <a:t>0.9.0 ??</a:t>
-            </a:r>
+              <a:t>0.9.0</a:t>
+            </a:r>
+            <a:endParaRPr lang="en-US" sz="3200" b="1" dirty="0">
+              <a:latin typeface="Arial" panose="020B0604020202020204" pitchFamily="34" charset="0"/>
+              <a:cs typeface="Arial" panose="020B0604020202020204" pitchFamily="34" charset="0"/>
+            </a:endParaRPr>
           </a:p>
         </p:txBody>
       </p:sp>
@@ -23280,7 +23303,7 @@
         <p:spPr>
           <a:xfrm>
             <a:off x="6888088" y="2249792"/>
-            <a:ext cx="4515852" cy="338554"/>
+            <a:ext cx="4312271" cy="338554"/>
           </a:xfrm>
           <a:prstGeom prst="rect">
             <a:avLst/>
@@ -23294,12 +23317,28 @@
           <a:lstStyle/>
           <a:p>
             <a:r>
-              <a:rPr lang="en-US" sz="1600"/>
-              <a:t>Same as knowledge_graph </a:t>
-            </a:r>
-            <a:r>
-              <a:rPr lang="en-US" sz="1200"/>
-              <a:t>(but can be shortened to just ids)</a:t>
+              <a:rPr lang="en-US" sz="1600" dirty="0"/>
+              <a:t>Same as </a:t>
+            </a:r>
+            <a:r>
+              <a:rPr lang="en-US" sz="1600" dirty="0" err="1"/>
+              <a:t>knowledge_graph</a:t>
+            </a:r>
+            <a:r>
+              <a:rPr lang="en-US" sz="1600" dirty="0"/>
+              <a:t> </a:t>
+            </a:r>
+            <a:r>
+              <a:rPr lang="en-US" sz="1200" dirty="0"/>
+              <a:t>(but can be </a:t>
+            </a:r>
+            <a:r>
+              <a:rPr lang="en-US" sz="1200" dirty="0" smtClean="0"/>
+              <a:t>limited </a:t>
+            </a:r>
+            <a:r>
+              <a:rPr lang="en-US" sz="1200" dirty="0"/>
+              <a:t>to just ids)</a:t>
             </a:r>
           </a:p>
         </p:txBody>
@@ -23573,31 +23612,31 @@
           <a:lstStyle/>
           <a:p>
             <a:r>
-              <a:rPr lang="en-US"/>
+              <a:rPr lang="en-US" dirty="0"/>
               <a:t>Answer types:</a:t>
             </a:r>
           </a:p>
           <a:p>
             <a:r>
-              <a:rPr lang="en-US"/>
+              <a:rPr lang="en-US" dirty="0"/>
               <a:t>  A – Simple values and types</a:t>
             </a:r>
           </a:p>
           <a:p>
             <a:r>
-              <a:rPr lang="en-US"/>
+              <a:rPr lang="en-US" dirty="0"/>
               <a:t>  B – Tabular result</a:t>
             </a:r>
           </a:p>
           <a:p>
             <a:r>
-              <a:rPr lang="en-US"/>
+              <a:rPr lang="en-US" dirty="0"/>
               <a:t>  C – Full graph result</a:t>
             </a:r>
           </a:p>
           <a:p>
             <a:r>
-              <a:rPr lang="en-US"/>
+              <a:rPr lang="en-US" dirty="0"/>
               <a:t>  D – Knowledge map result</a:t>
             </a:r>
           </a:p>
@@ -23717,7 +23756,7 @@
         </p:nvSpPr>
         <p:spPr>
           <a:xfrm>
-            <a:off x="8011895" y="2974492"/>
+            <a:off x="7988891" y="3760266"/>
             <a:ext cx="1682802" cy="285308"/>
           </a:xfrm>
           <a:prstGeom prst="rect">
@@ -23769,7 +23808,7 @@
         </p:nvSpPr>
         <p:spPr>
           <a:xfrm>
-            <a:off x="9801634" y="3056550"/>
+            <a:off x="9778630" y="3842324"/>
             <a:ext cx="200587" cy="121191"/>
           </a:xfrm>
           <a:prstGeom prst="rightArrow">
@@ -23815,7 +23854,7 @@
         </p:nvSpPr>
         <p:spPr>
           <a:xfrm>
-            <a:off x="10149163" y="2969959"/>
+            <a:off x="10126159" y="3755733"/>
             <a:ext cx="982819" cy="285308"/>
           </a:xfrm>
           <a:prstGeom prst="rect">
@@ -23867,7 +23906,7 @@
         </p:nvSpPr>
         <p:spPr>
           <a:xfrm>
-            <a:off x="8011895" y="3309396"/>
+            <a:off x="7988891" y="4095170"/>
             <a:ext cx="1682802" cy="285308"/>
           </a:xfrm>
           <a:prstGeom prst="rect">
@@ -23919,7 +23958,7 @@
         </p:nvSpPr>
         <p:spPr>
           <a:xfrm>
-            <a:off x="9801634" y="3391454"/>
+            <a:off x="9778630" y="4177228"/>
             <a:ext cx="200587" cy="121191"/>
           </a:xfrm>
           <a:prstGeom prst="rightArrow">
@@ -23965,7 +24004,7 @@
         </p:nvSpPr>
         <p:spPr>
           <a:xfrm>
-            <a:off x="10149163" y="3304863"/>
+            <a:off x="10126159" y="4090637"/>
             <a:ext cx="982819" cy="285308"/>
           </a:xfrm>
           <a:prstGeom prst="rect">
@@ -24017,7 +24056,7 @@
         </p:nvSpPr>
         <p:spPr>
           <a:xfrm>
-            <a:off x="8011895" y="3651001"/>
+            <a:off x="7988891" y="4436775"/>
             <a:ext cx="1682802" cy="285308"/>
           </a:xfrm>
           <a:prstGeom prst="rect">
@@ -24069,7 +24108,7 @@
         </p:nvSpPr>
         <p:spPr>
           <a:xfrm>
-            <a:off x="9801634" y="3733059"/>
+            <a:off x="9778630" y="4518833"/>
             <a:ext cx="200587" cy="121191"/>
           </a:xfrm>
           <a:prstGeom prst="rightArrow">
@@ -24115,7 +24154,7 @@
         </p:nvSpPr>
         <p:spPr>
           <a:xfrm>
-            <a:off x="10149163" y="3646468"/>
+            <a:off x="10126159" y="4432242"/>
             <a:ext cx="982819" cy="285308"/>
           </a:xfrm>
           <a:prstGeom prst="rect">
@@ -24167,51 +24206,7 @@
         </p:nvSpPr>
         <p:spPr>
           <a:xfrm>
-            <a:off x="7789693" y="2959351"/>
-            <a:ext cx="89544" cy="331942"/>
-          </a:xfrm>
-          <a:prstGeom prst="leftBrace">
-            <a:avLst/>
-          </a:prstGeom>
-        </p:spPr>
-        <p:style>
-          <a:lnRef idx="1">
-            <a:schemeClr val="accent1"/>
-          </a:lnRef>
-          <a:fillRef idx="0">
-            <a:schemeClr val="accent1"/>
-          </a:fillRef>
-          <a:effectRef idx="0">
-            <a:schemeClr val="accent1"/>
-          </a:effectRef>
-          <a:fontRef idx="minor">
-            <a:schemeClr val="tx1"/>
-          </a:fontRef>
-        </p:style>
-        <p:txBody>
-          <a:bodyPr rtlCol="0" anchor="ctr"/>
-          <a:lstStyle/>
-          <a:p>
-            <a:pPr algn="ctr"/>
-            <a:endParaRPr lang="en-US"/>
-          </a:p>
-        </p:txBody>
-      </p:sp>
-      <p:sp>
-        <p:nvSpPr>
-          <p:cNvPr id="121" name="Left Brace 120">
-            <a:extLst>
-              <a:ext uri="{FF2B5EF4-FFF2-40B4-BE49-F238E27FC236}">
-                <a16:creationId xmlns:a16="http://schemas.microsoft.com/office/drawing/2014/main" id="{B666EDD2-9954-4245-AC10-93234C9CEB35}"/>
-              </a:ext>
-            </a:extLst>
-          </p:cNvPr>
-          <p:cNvSpPr/>
-          <p:nvPr/>
-        </p:nvSpPr>
-        <p:spPr>
-          <a:xfrm flipH="1">
-            <a:off x="11224554" y="3625532"/>
+            <a:off x="7490641" y="3745125"/>
             <a:ext cx="89544" cy="331942"/>
           </a:xfrm>
           <a:prstGeom prst="leftBrace">
@@ -24259,7 +24254,7 @@
         <p:spPr>
           <a:xfrm flipH="1" flipV="1">
             <a:off x="6559968" y="2801099"/>
-            <a:ext cx="1088101" cy="255451"/>
+            <a:ext cx="816126" cy="1097288"/>
           </a:xfrm>
           <a:prstGeom prst="line">
             <a:avLst/>
@@ -24294,7 +24289,7 @@
         </p:nvSpPr>
         <p:spPr>
           <a:xfrm>
-            <a:off x="10298957" y="3888534"/>
+            <a:off x="11104664" y="4400803"/>
             <a:ext cx="458780" cy="307777"/>
           </a:xfrm>
           <a:prstGeom prst="rect">
@@ -24330,7 +24325,7 @@
         </p:nvSpPr>
         <p:spPr>
           <a:xfrm>
-            <a:off x="8862283" y="2711859"/>
+            <a:off x="7591199" y="3767068"/>
             <a:ext cx="461986" cy="307777"/>
           </a:xfrm>
           <a:prstGeom prst="rect">
@@ -24365,7 +24360,7 @@
         </p:nvSpPr>
         <p:spPr>
           <a:xfrm>
-            <a:off x="8668409" y="3884233"/>
+            <a:off x="7589303" y="4440013"/>
             <a:ext cx="457176" cy="307777"/>
           </a:xfrm>
           <a:prstGeom prst="rect">
@@ -24380,7 +24375,7 @@
           <a:lstStyle/>
           <a:p>
             <a:r>
-              <a:rPr lang="en-US" sz="1400"/>
+              <a:rPr lang="en-US" sz="1400" dirty="0"/>
               <a:t>e00</a:t>
             </a:r>
           </a:p>
@@ -24569,7 +24564,7 @@
         </p:nvSpPr>
         <p:spPr>
           <a:xfrm>
-            <a:off x="6516592" y="2769531"/>
+            <a:off x="6596417" y="2709932"/>
             <a:ext cx="327334" cy="369332"/>
           </a:xfrm>
           <a:prstGeom prst="rect">
@@ -24641,23 +24636,62 @@
       </p:sp>
       <p:sp>
         <p:nvSpPr>
-          <p:cNvPr id="59" name="Rectangle 58"/>
+          <p:cNvPr id="79" name="TextBox 78">
+            <a:extLst>
+              <a:ext uri="{FF2B5EF4-FFF2-40B4-BE49-F238E27FC236}">
+                <a16:creationId xmlns:a16="http://schemas.microsoft.com/office/drawing/2014/main" id="{CCA6EFFB-6B94-4D1E-A6B4-51207A603BB3}"/>
+              </a:ext>
+            </a:extLst>
+          </p:cNvPr>
+          <p:cNvSpPr txBox="1"/>
+          <p:nvPr/>
+        </p:nvSpPr>
+        <p:spPr>
+          <a:xfrm>
+            <a:off x="7589303" y="4093026"/>
+            <a:ext cx="461986" cy="307777"/>
+          </a:xfrm>
+          <a:prstGeom prst="rect">
+            <a:avLst/>
+          </a:prstGeom>
+          <a:noFill/>
+        </p:spPr>
+        <p:txBody>
+          <a:bodyPr wrap="none" rtlCol="0">
+            <a:spAutoFit/>
+          </a:bodyPr>
+          <a:lstStyle/>
+          <a:p>
+            <a:r>
+              <a:rPr lang="en-US" sz="1400" dirty="0" smtClean="0"/>
+              <a:t>n01</a:t>
+            </a:r>
+            <a:endParaRPr lang="en-US" sz="1400" dirty="0"/>
+          </a:p>
+        </p:txBody>
+      </p:sp>
+      <p:sp>
+        <p:nvSpPr>
+          <p:cNvPr id="80" name="Rectangle 79">
+            <a:extLst>
+              <a:ext uri="{FF2B5EF4-FFF2-40B4-BE49-F238E27FC236}">
+                <a16:creationId xmlns:a16="http://schemas.microsoft.com/office/drawing/2014/main" id="{F79C781B-821C-45CD-9B3F-BB1706360DFF}"/>
+              </a:ext>
+            </a:extLst>
+          </p:cNvPr>
           <p:cNvSpPr/>
           <p:nvPr/>
         </p:nvSpPr>
         <p:spPr>
           <a:xfrm>
-            <a:off x="6169945" y="4519228"/>
-            <a:ext cx="2267596" cy="482009"/>
-          </a:xfrm>
-          <a:prstGeom prst="rect">
-            <a:avLst/>
-          </a:prstGeom>
-          <a:solidFill>
-            <a:schemeClr val="accent5">
-              <a:lumMod val="60000"/>
-              <a:lumOff val="40000"/>
-            </a:schemeClr>
+            <a:off x="7988891" y="4782458"/>
+            <a:ext cx="1682802" cy="285308"/>
+          </a:xfrm>
+          <a:prstGeom prst="rect">
+            <a:avLst/>
+          </a:prstGeom>
+          <a:solidFill>
+            <a:srgbClr val="7030A0"/>
           </a:solidFill>
         </p:spPr>
         <p:style>
@@ -24680,59 +24714,20 @@
           <a:bodyPr rtlCol="0" anchor="ctr"/>
           <a:lstStyle/>
           <a:p>
-            <a:pPr algn="ctr"/>
-            <a:r>
-              <a:rPr lang="en-US" dirty="0" err="1" smtClean="0"/>
-              <a:t>NodeEdgeNodeTriple</a:t>
+            <a:r>
+              <a:rPr lang="en-US"/>
+              <a:t>QNode.node_id</a:t>
             </a:r>
             <a:endParaRPr lang="en-US" dirty="0"/>
           </a:p>
         </p:txBody>
       </p:sp>
-      <p:cxnSp>
-        <p:nvCxnSpPr>
-          <p:cNvPr id="60" name="Straight Connector 59">
-            <a:extLst>
-              <a:ext uri="{FF2B5EF4-FFF2-40B4-BE49-F238E27FC236}">
-                <a16:creationId xmlns:a16="http://schemas.microsoft.com/office/drawing/2014/main" id="{E88BDB54-1589-44C1-AA1D-7FE0831A3B3B}"/>
-              </a:ext>
-            </a:extLst>
-          </p:cNvPr>
-          <p:cNvCxnSpPr>
-            <a:cxnSpLocks/>
-          </p:cNvCxnSpPr>
-          <p:nvPr/>
-        </p:nvCxnSpPr>
-        <p:spPr>
-          <a:xfrm flipH="1" flipV="1">
-            <a:off x="6125414" y="2969959"/>
-            <a:ext cx="623759" cy="1543858"/>
-          </a:xfrm>
-          <a:prstGeom prst="line">
-            <a:avLst/>
-          </a:prstGeom>
-        </p:spPr>
-        <p:style>
-          <a:lnRef idx="1">
-            <a:schemeClr val="accent1"/>
-          </a:lnRef>
-          <a:fillRef idx="0">
-            <a:schemeClr val="accent1"/>
-          </a:fillRef>
-          <a:effectRef idx="0">
-            <a:schemeClr val="accent1"/>
-          </a:effectRef>
-          <a:fontRef idx="minor">
-            <a:schemeClr val="tx1"/>
-          </a:fontRef>
-        </p:style>
-      </p:cxnSp>
-      <p:sp>
-        <p:nvSpPr>
-          <p:cNvPr id="63" name="Rectangle 62">
-            <a:extLst>
-              <a:ext uri="{FF2B5EF4-FFF2-40B4-BE49-F238E27FC236}">
-                <a16:creationId xmlns:a16="http://schemas.microsoft.com/office/drawing/2014/main" id="{8BB60470-A189-4291-9E74-07661CB08901}"/>
+      <p:sp>
+        <p:nvSpPr>
+          <p:cNvPr id="83" name="Arrow: Right 103">
+            <a:extLst>
+              <a:ext uri="{FF2B5EF4-FFF2-40B4-BE49-F238E27FC236}">
+                <a16:creationId xmlns:a16="http://schemas.microsoft.com/office/drawing/2014/main" id="{143EB565-00D6-44AA-9191-742F9DCD5C94}"/>
               </a:ext>
             </a:extLst>
           </p:cNvPr>
@@ -24741,15 +24736,12 @@
         </p:nvSpPr>
         <p:spPr>
           <a:xfrm>
-            <a:off x="9406975" y="4556134"/>
-            <a:ext cx="2143241" cy="285308"/>
-          </a:xfrm>
-          <a:prstGeom prst="rect">
-            <a:avLst/>
-          </a:prstGeom>
-          <a:solidFill>
-            <a:srgbClr val="00B050"/>
-          </a:solidFill>
+            <a:off x="9778630" y="4864516"/>
+            <a:ext cx="200587" cy="121191"/>
+          </a:xfrm>
+          <a:prstGeom prst="rightArrow">
+            <a:avLst/>
+          </a:prstGeom>
         </p:spPr>
         <p:style>
           <a:lnRef idx="2">
@@ -24771,20 +24763,17 @@
           <a:bodyPr rtlCol="0" anchor="ctr"/>
           <a:lstStyle/>
           <a:p>
-            <a:r>
-              <a:rPr lang="en-US" dirty="0" err="1" smtClean="0"/>
-              <a:t>nodeA_QG_node_id</a:t>
-            </a:r>
-            <a:endParaRPr lang="en-US" dirty="0"/>
-          </a:p>
-        </p:txBody>
-      </p:sp>
-      <p:sp>
-        <p:nvSpPr>
-          <p:cNvPr id="64" name="Rectangle 63">
-            <a:extLst>
-              <a:ext uri="{FF2B5EF4-FFF2-40B4-BE49-F238E27FC236}">
-                <a16:creationId xmlns:a16="http://schemas.microsoft.com/office/drawing/2014/main" id="{8BB60470-A189-4291-9E74-07661CB08901}"/>
+            <a:pPr algn="ctr"/>
+            <a:endParaRPr lang="en-US"/>
+          </a:p>
+        </p:txBody>
+      </p:sp>
+      <p:sp>
+        <p:nvSpPr>
+          <p:cNvPr id="85" name="Rectangle 84">
+            <a:extLst>
+              <a:ext uri="{FF2B5EF4-FFF2-40B4-BE49-F238E27FC236}">
+                <a16:creationId xmlns:a16="http://schemas.microsoft.com/office/drawing/2014/main" id="{EA4B47FD-A72B-4605-9DBB-C7D39A4C92B9}"/>
               </a:ext>
             </a:extLst>
           </p:cNvPr>
@@ -24793,14 +24782,14 @@
         </p:nvSpPr>
         <p:spPr>
           <a:xfrm>
-            <a:off x="9406974" y="4928960"/>
-            <a:ext cx="1536643" cy="285308"/>
-          </a:xfrm>
-          <a:prstGeom prst="rect">
-            <a:avLst/>
-          </a:prstGeom>
-          <a:solidFill>
-            <a:srgbClr val="00B050"/>
+            <a:off x="10126159" y="4777925"/>
+            <a:ext cx="982819" cy="285308"/>
+          </a:xfrm>
+          <a:prstGeom prst="rect">
+            <a:avLst/>
+          </a:prstGeom>
+          <a:solidFill>
+            <a:srgbClr val="7030A0"/>
           </a:solidFill>
         </p:spPr>
         <p:style>
@@ -24824,8 +24813,8 @@
           <a:lstStyle/>
           <a:p>
             <a:r>
-              <a:rPr lang="en-US" dirty="0" err="1" smtClean="0"/>
-              <a:t>nodeA_KG_id</a:t>
+              <a:rPr lang="en-US"/>
+              <a:t>Node.id</a:t>
             </a:r>
             <a:endParaRPr lang="en-US" dirty="0"/>
           </a:p>
@@ -24833,10 +24822,10 @@
       </p:sp>
       <p:sp>
         <p:nvSpPr>
-          <p:cNvPr id="65" name="Rectangle 64">
-            <a:extLst>
-              <a:ext uri="{FF2B5EF4-FFF2-40B4-BE49-F238E27FC236}">
-                <a16:creationId xmlns:a16="http://schemas.microsoft.com/office/drawing/2014/main" id="{8BB60470-A189-4291-9E74-07661CB08901}"/>
+          <p:cNvPr id="86" name="Rectangle 85">
+            <a:extLst>
+              <a:ext uri="{FF2B5EF4-FFF2-40B4-BE49-F238E27FC236}">
+                <a16:creationId xmlns:a16="http://schemas.microsoft.com/office/drawing/2014/main" id="{195AEDA5-2701-41B7-AED6-5A793DEC4463}"/>
               </a:ext>
             </a:extLst>
           </p:cNvPr>
@@ -24845,14 +24834,14 @@
         </p:nvSpPr>
         <p:spPr>
           <a:xfrm>
-            <a:off x="9406974" y="5298252"/>
-            <a:ext cx="2143242" cy="285308"/>
-          </a:xfrm>
-          <a:prstGeom prst="rect">
-            <a:avLst/>
-          </a:prstGeom>
-          <a:solidFill>
-            <a:srgbClr val="00B050"/>
+            <a:off x="7988891" y="5124063"/>
+            <a:ext cx="1682802" cy="285308"/>
+          </a:xfrm>
+          <a:prstGeom prst="rect">
+            <a:avLst/>
+          </a:prstGeom>
+          <a:solidFill>
+            <a:srgbClr val="7030A0"/>
           </a:solidFill>
         </p:spPr>
         <p:style>
@@ -24877,7 +24866,7 @@
           <a:p>
             <a:r>
               <a:rPr lang="en-US" dirty="0" err="1" smtClean="0"/>
-              <a:t>nodeB_QG_node_id</a:t>
+              <a:t>QEdge.edge_id</a:t>
             </a:r>
             <a:endParaRPr lang="en-US" dirty="0"/>
           </a:p>
@@ -24885,10 +24874,10 @@
       </p:sp>
       <p:sp>
         <p:nvSpPr>
-          <p:cNvPr id="66" name="Rectangle 65">
-            <a:extLst>
-              <a:ext uri="{FF2B5EF4-FFF2-40B4-BE49-F238E27FC236}">
-                <a16:creationId xmlns:a16="http://schemas.microsoft.com/office/drawing/2014/main" id="{8BB60470-A189-4291-9E74-07661CB08901}"/>
+          <p:cNvPr id="89" name="Arrow: Right 118">
+            <a:extLst>
+              <a:ext uri="{FF2B5EF4-FFF2-40B4-BE49-F238E27FC236}">
+                <a16:creationId xmlns:a16="http://schemas.microsoft.com/office/drawing/2014/main" id="{7D1073AB-0B11-45DB-A1FE-EF21AB77AFE9}"/>
               </a:ext>
             </a:extLst>
           </p:cNvPr>
@@ -24897,15 +24886,12 @@
         </p:nvSpPr>
         <p:spPr>
           <a:xfrm>
-            <a:off x="9406973" y="5671078"/>
-            <a:ext cx="1536644" cy="285308"/>
-          </a:xfrm>
-          <a:prstGeom prst="rect">
-            <a:avLst/>
-          </a:prstGeom>
-          <a:solidFill>
-            <a:srgbClr val="00B050"/>
-          </a:solidFill>
+            <a:off x="9778630" y="5206121"/>
+            <a:ext cx="200587" cy="121191"/>
+          </a:xfrm>
+          <a:prstGeom prst="rightArrow">
+            <a:avLst/>
+          </a:prstGeom>
         </p:spPr>
         <p:style>
           <a:lnRef idx="2">
@@ -24927,20 +24913,17 @@
           <a:bodyPr rtlCol="0" anchor="ctr"/>
           <a:lstStyle/>
           <a:p>
-            <a:r>
-              <a:rPr lang="en-US" dirty="0" err="1" smtClean="0"/>
-              <a:t>nodeB_KG_id</a:t>
-            </a:r>
-            <a:endParaRPr lang="en-US" dirty="0"/>
-          </a:p>
-        </p:txBody>
-      </p:sp>
-      <p:sp>
-        <p:nvSpPr>
-          <p:cNvPr id="67" name="Rectangle 66">
-            <a:extLst>
-              <a:ext uri="{FF2B5EF4-FFF2-40B4-BE49-F238E27FC236}">
-                <a16:creationId xmlns:a16="http://schemas.microsoft.com/office/drawing/2014/main" id="{8BB60470-A189-4291-9E74-07661CB08901}"/>
+            <a:pPr algn="ctr"/>
+            <a:endParaRPr lang="en-US"/>
+          </a:p>
+        </p:txBody>
+      </p:sp>
+      <p:sp>
+        <p:nvSpPr>
+          <p:cNvPr id="92" name="Rectangle 91">
+            <a:extLst>
+              <a:ext uri="{FF2B5EF4-FFF2-40B4-BE49-F238E27FC236}">
+                <a16:creationId xmlns:a16="http://schemas.microsoft.com/office/drawing/2014/main" id="{9956C953-7BA4-4FCF-8863-704C1497D723}"/>
               </a:ext>
             </a:extLst>
           </p:cNvPr>
@@ -24949,14 +24932,14 @@
         </p:nvSpPr>
         <p:spPr>
           <a:xfrm>
-            <a:off x="9406973" y="6030942"/>
-            <a:ext cx="2143243" cy="285308"/>
-          </a:xfrm>
-          <a:prstGeom prst="rect">
-            <a:avLst/>
-          </a:prstGeom>
-          <a:solidFill>
-            <a:srgbClr val="00B050"/>
+            <a:off x="10126159" y="5119530"/>
+            <a:ext cx="982819" cy="285308"/>
+          </a:xfrm>
+          <a:prstGeom prst="rect">
+            <a:avLst/>
+          </a:prstGeom>
+          <a:solidFill>
+            <a:srgbClr val="7030A0"/>
           </a:solidFill>
         </p:spPr>
         <p:style>
@@ -24980,8 +24963,8 @@
           <a:lstStyle/>
           <a:p>
             <a:r>
-              <a:rPr lang="en-US" dirty="0" err="1" smtClean="0"/>
-              <a:t>edge_QG_edge_id</a:t>
+              <a:rPr lang="en-US"/>
+              <a:t>Edge.id</a:t>
             </a:r>
             <a:endParaRPr lang="en-US" dirty="0"/>
           </a:p>
@@ -24989,10 +24972,10 @@
       </p:sp>
       <p:sp>
         <p:nvSpPr>
-          <p:cNvPr id="68" name="Rectangle 67">
-            <a:extLst>
-              <a:ext uri="{FF2B5EF4-FFF2-40B4-BE49-F238E27FC236}">
-                <a16:creationId xmlns:a16="http://schemas.microsoft.com/office/drawing/2014/main" id="{8BB60470-A189-4291-9E74-07661CB08901}"/>
+          <p:cNvPr id="94" name="Left Brace 93">
+            <a:extLst>
+              <a:ext uri="{FF2B5EF4-FFF2-40B4-BE49-F238E27FC236}">
+                <a16:creationId xmlns:a16="http://schemas.microsoft.com/office/drawing/2014/main" id="{B666EDD2-9954-4245-AC10-93234C9CEB35}"/>
               </a:ext>
             </a:extLst>
           </p:cNvPr>
@@ -25000,51 +24983,43 @@
           <p:nvPr/>
         </p:nvSpPr>
         <p:spPr>
-          <a:xfrm>
-            <a:off x="9406972" y="6403768"/>
-            <a:ext cx="1419913" cy="285308"/>
-          </a:xfrm>
-          <a:prstGeom prst="rect">
-            <a:avLst/>
-          </a:prstGeom>
-          <a:solidFill>
-            <a:srgbClr val="00B050"/>
-          </a:solidFill>
-        </p:spPr>
-        <p:style>
-          <a:lnRef idx="2">
-            <a:schemeClr val="accent1">
-              <a:shade val="50000"/>
-            </a:schemeClr>
-          </a:lnRef>
-          <a:fillRef idx="1">
-            <a:schemeClr val="accent1"/>
-          </a:fillRef>
-          <a:effectRef idx="0">
-            <a:schemeClr val="accent1"/>
-          </a:effectRef>
-          <a:fontRef idx="minor">
-            <a:schemeClr val="lt1"/>
+          <a:xfrm flipH="1">
+            <a:off x="11563863" y="5098594"/>
+            <a:ext cx="89544" cy="331942"/>
+          </a:xfrm>
+          <a:prstGeom prst="leftBrace">
+            <a:avLst/>
+          </a:prstGeom>
+        </p:spPr>
+        <p:style>
+          <a:lnRef idx="1">
+            <a:schemeClr val="accent1"/>
+          </a:lnRef>
+          <a:fillRef idx="0">
+            <a:schemeClr val="accent1"/>
+          </a:fillRef>
+          <a:effectRef idx="0">
+            <a:schemeClr val="accent1"/>
+          </a:effectRef>
+          <a:fontRef idx="minor">
+            <a:schemeClr val="tx1"/>
           </a:fontRef>
         </p:style>
         <p:txBody>
           <a:bodyPr rtlCol="0" anchor="ctr"/>
           <a:lstStyle/>
           <a:p>
-            <a:r>
-              <a:rPr lang="en-US" dirty="0" err="1" smtClean="0"/>
-              <a:t>edge_KG_id</a:t>
-            </a:r>
-            <a:endParaRPr lang="en-US" dirty="0"/>
-          </a:p>
-        </p:txBody>
-      </p:sp>
-      <p:sp>
-        <p:nvSpPr>
-          <p:cNvPr id="69" name="TextBox 68">
-            <a:extLst>
-              <a:ext uri="{FF2B5EF4-FFF2-40B4-BE49-F238E27FC236}">
-                <a16:creationId xmlns:a16="http://schemas.microsoft.com/office/drawing/2014/main" id="{318D1BCA-FB7A-49FD-BCB8-FD95E4E2E5B8}"/>
+            <a:pPr algn="ctr"/>
+            <a:endParaRPr lang="en-US"/>
+          </a:p>
+        </p:txBody>
+      </p:sp>
+      <p:sp>
+        <p:nvSpPr>
+          <p:cNvPr id="95" name="TextBox 94">
+            <a:extLst>
+              <a:ext uri="{FF2B5EF4-FFF2-40B4-BE49-F238E27FC236}">
+                <a16:creationId xmlns:a16="http://schemas.microsoft.com/office/drawing/2014/main" id="{5D652CBE-9E14-4B60-BFA9-F9F3DA64E047}"/>
               </a:ext>
             </a:extLst>
           </p:cNvPr>
@@ -25053,8 +25028,116 @@
         </p:nvSpPr>
         <p:spPr>
           <a:xfrm>
-            <a:off x="6773215" y="3811479"/>
-            <a:ext cx="1757916" cy="584775"/>
+            <a:off x="11104664" y="5088091"/>
+            <a:ext cx="458780" cy="307777"/>
+          </a:xfrm>
+          <a:prstGeom prst="rect">
+            <a:avLst/>
+          </a:prstGeom>
+          <a:noFill/>
+        </p:spPr>
+        <p:txBody>
+          <a:bodyPr wrap="none" rtlCol="0">
+            <a:spAutoFit/>
+          </a:bodyPr>
+          <a:lstStyle/>
+          <a:p>
+            <a:r>
+              <a:rPr lang="en-US" sz="1400" dirty="0" smtClean="0"/>
+              <a:t>837</a:t>
+            </a:r>
+            <a:endParaRPr lang="en-US" sz="1400" dirty="0"/>
+          </a:p>
+        </p:txBody>
+      </p:sp>
+      <p:sp>
+        <p:nvSpPr>
+          <p:cNvPr id="96" name="TextBox 95">
+            <a:extLst>
+              <a:ext uri="{FF2B5EF4-FFF2-40B4-BE49-F238E27FC236}">
+                <a16:creationId xmlns:a16="http://schemas.microsoft.com/office/drawing/2014/main" id="{437D8D91-FBA0-4A0D-888B-A7A0D9D20B6F}"/>
+              </a:ext>
+            </a:extLst>
+          </p:cNvPr>
+          <p:cNvSpPr txBox="1"/>
+          <p:nvPr/>
+        </p:nvSpPr>
+        <p:spPr>
+          <a:xfrm>
+            <a:off x="7589303" y="5127301"/>
+            <a:ext cx="457176" cy="307777"/>
+          </a:xfrm>
+          <a:prstGeom prst="rect">
+            <a:avLst/>
+          </a:prstGeom>
+          <a:noFill/>
+        </p:spPr>
+        <p:txBody>
+          <a:bodyPr wrap="none" rtlCol="0">
+            <a:spAutoFit/>
+          </a:bodyPr>
+          <a:lstStyle/>
+          <a:p>
+            <a:r>
+              <a:rPr lang="en-US" sz="1400" dirty="0" smtClean="0"/>
+              <a:t>e01</a:t>
+            </a:r>
+            <a:endParaRPr lang="en-US" sz="1400" dirty="0"/>
+          </a:p>
+        </p:txBody>
+      </p:sp>
+      <p:sp>
+        <p:nvSpPr>
+          <p:cNvPr id="98" name="TextBox 97">
+            <a:extLst>
+              <a:ext uri="{FF2B5EF4-FFF2-40B4-BE49-F238E27FC236}">
+                <a16:creationId xmlns:a16="http://schemas.microsoft.com/office/drawing/2014/main" id="{CCA6EFFB-6B94-4D1E-A6B4-51207A603BB3}"/>
+              </a:ext>
+            </a:extLst>
+          </p:cNvPr>
+          <p:cNvSpPr txBox="1"/>
+          <p:nvPr/>
+        </p:nvSpPr>
+        <p:spPr>
+          <a:xfrm>
+            <a:off x="7589303" y="4780314"/>
+            <a:ext cx="461986" cy="307777"/>
+          </a:xfrm>
+          <a:prstGeom prst="rect">
+            <a:avLst/>
+          </a:prstGeom>
+          <a:noFill/>
+        </p:spPr>
+        <p:txBody>
+          <a:bodyPr wrap="none" rtlCol="0">
+            <a:spAutoFit/>
+          </a:bodyPr>
+          <a:lstStyle/>
+          <a:p>
+            <a:r>
+              <a:rPr lang="en-US" sz="1400" dirty="0" smtClean="0"/>
+              <a:t>n02</a:t>
+            </a:r>
+            <a:endParaRPr lang="en-US" sz="1400" dirty="0"/>
+          </a:p>
+        </p:txBody>
+      </p:sp>
+      <p:sp>
+        <p:nvSpPr>
+          <p:cNvPr id="99" name="TextBox 98">
+            <a:extLst>
+              <a:ext uri="{FF2B5EF4-FFF2-40B4-BE49-F238E27FC236}">
+                <a16:creationId xmlns:a16="http://schemas.microsoft.com/office/drawing/2014/main" id="{D43FF069-6477-47B9-A274-9C07CDF57C56}"/>
+              </a:ext>
+            </a:extLst>
+          </p:cNvPr>
+          <p:cNvSpPr txBox="1"/>
+          <p:nvPr/>
+        </p:nvSpPr>
+        <p:spPr>
+          <a:xfrm>
+            <a:off x="7589303" y="3105657"/>
+            <a:ext cx="4474253" cy="584775"/>
           </a:xfrm>
           <a:prstGeom prst="rect">
             <a:avLst/>
@@ -25068,289 +25151,32 @@
           <a:lstStyle/>
           <a:p>
             <a:r>
-              <a:rPr lang="en-US" sz="3200" b="1" dirty="0" smtClean="0">
-                <a:latin typeface="Arial" panose="020B0604020202020204" pitchFamily="34" charset="0"/>
-                <a:cs typeface="Arial" panose="020B0604020202020204" pitchFamily="34" charset="0"/>
-              </a:rPr>
-              <a:t>OR??</a:t>
-            </a:r>
-            <a:endParaRPr lang="en-US" sz="3200" b="1" dirty="0">
-              <a:latin typeface="Arial" panose="020B0604020202020204" pitchFamily="34" charset="0"/>
-              <a:cs typeface="Arial" panose="020B0604020202020204" pitchFamily="34" charset="0"/>
-            </a:endParaRPr>
-          </a:p>
-        </p:txBody>
-      </p:sp>
-      <p:cxnSp>
-        <p:nvCxnSpPr>
-          <p:cNvPr id="70" name="Straight Connector 69">
-            <a:extLst>
-              <a:ext uri="{FF2B5EF4-FFF2-40B4-BE49-F238E27FC236}">
-                <a16:creationId xmlns:a16="http://schemas.microsoft.com/office/drawing/2014/main" id="{E88BDB54-1589-44C1-AA1D-7FE0831A3B3B}"/>
-              </a:ext>
-            </a:extLst>
-          </p:cNvPr>
-          <p:cNvCxnSpPr>
-            <a:cxnSpLocks/>
-            <a:stCxn id="63" idx="1"/>
-            <a:endCxn id="59" idx="3"/>
-          </p:cNvCxnSpPr>
-          <p:nvPr/>
-        </p:nvCxnSpPr>
-        <p:spPr>
-          <a:xfrm flipH="1">
-            <a:off x="8437541" y="4698788"/>
-            <a:ext cx="969434" cy="61445"/>
-          </a:xfrm>
-          <a:prstGeom prst="line">
-            <a:avLst/>
-          </a:prstGeom>
-        </p:spPr>
-        <p:style>
-          <a:lnRef idx="1">
-            <a:schemeClr val="accent1"/>
-          </a:lnRef>
-          <a:fillRef idx="0">
-            <a:schemeClr val="accent1"/>
-          </a:fillRef>
-          <a:effectRef idx="0">
-            <a:schemeClr val="accent1"/>
-          </a:effectRef>
-          <a:fontRef idx="minor">
-            <a:schemeClr val="tx1"/>
-          </a:fontRef>
-        </p:style>
-      </p:cxnSp>
-      <p:cxnSp>
-        <p:nvCxnSpPr>
-          <p:cNvPr id="73" name="Straight Connector 72">
-            <a:extLst>
-              <a:ext uri="{FF2B5EF4-FFF2-40B4-BE49-F238E27FC236}">
-                <a16:creationId xmlns:a16="http://schemas.microsoft.com/office/drawing/2014/main" id="{E88BDB54-1589-44C1-AA1D-7FE0831A3B3B}"/>
-              </a:ext>
-            </a:extLst>
-          </p:cNvPr>
-          <p:cNvCxnSpPr>
-            <a:cxnSpLocks/>
-            <a:stCxn id="64" idx="1"/>
-          </p:cNvCxnSpPr>
-          <p:nvPr/>
-        </p:nvCxnSpPr>
-        <p:spPr>
-          <a:xfrm flipH="1" flipV="1">
-            <a:off x="8418504" y="4769920"/>
-            <a:ext cx="988470" cy="301694"/>
-          </a:xfrm>
-          <a:prstGeom prst="line">
-            <a:avLst/>
-          </a:prstGeom>
-        </p:spPr>
-        <p:style>
-          <a:lnRef idx="1">
-            <a:schemeClr val="accent1"/>
-          </a:lnRef>
-          <a:fillRef idx="0">
-            <a:schemeClr val="accent1"/>
-          </a:fillRef>
-          <a:effectRef idx="0">
-            <a:schemeClr val="accent1"/>
-          </a:effectRef>
-          <a:fontRef idx="minor">
-            <a:schemeClr val="tx1"/>
-          </a:fontRef>
-        </p:style>
-      </p:cxnSp>
-      <p:cxnSp>
-        <p:nvCxnSpPr>
-          <p:cNvPr id="74" name="Straight Connector 73">
-            <a:extLst>
-              <a:ext uri="{FF2B5EF4-FFF2-40B4-BE49-F238E27FC236}">
-                <a16:creationId xmlns:a16="http://schemas.microsoft.com/office/drawing/2014/main" id="{E88BDB54-1589-44C1-AA1D-7FE0831A3B3B}"/>
-              </a:ext>
-            </a:extLst>
-          </p:cNvPr>
-          <p:cNvCxnSpPr>
-            <a:cxnSpLocks/>
-            <a:stCxn id="68" idx="1"/>
-            <a:endCxn id="59" idx="3"/>
-          </p:cNvCxnSpPr>
-          <p:nvPr/>
-        </p:nvCxnSpPr>
-        <p:spPr>
-          <a:xfrm flipH="1" flipV="1">
-            <a:off x="8437541" y="4760233"/>
-            <a:ext cx="969431" cy="1786189"/>
-          </a:xfrm>
-          <a:prstGeom prst="line">
-            <a:avLst/>
-          </a:prstGeom>
-        </p:spPr>
-        <p:style>
-          <a:lnRef idx="1">
-            <a:schemeClr val="accent1"/>
-          </a:lnRef>
-          <a:fillRef idx="0">
-            <a:schemeClr val="accent1"/>
-          </a:fillRef>
-          <a:effectRef idx="0">
-            <a:schemeClr val="accent1"/>
-          </a:effectRef>
-          <a:fontRef idx="minor">
-            <a:schemeClr val="tx1"/>
-          </a:fontRef>
-        </p:style>
-      </p:cxnSp>
-      <p:cxnSp>
-        <p:nvCxnSpPr>
-          <p:cNvPr id="75" name="Straight Connector 74">
-            <a:extLst>
-              <a:ext uri="{FF2B5EF4-FFF2-40B4-BE49-F238E27FC236}">
-                <a16:creationId xmlns:a16="http://schemas.microsoft.com/office/drawing/2014/main" id="{E88BDB54-1589-44C1-AA1D-7FE0831A3B3B}"/>
-              </a:ext>
-            </a:extLst>
-          </p:cNvPr>
-          <p:cNvCxnSpPr>
-            <a:cxnSpLocks/>
-            <a:stCxn id="65" idx="1"/>
-            <a:endCxn id="59" idx="3"/>
-          </p:cNvCxnSpPr>
-          <p:nvPr/>
-        </p:nvCxnSpPr>
-        <p:spPr>
-          <a:xfrm flipH="1" flipV="1">
-            <a:off x="8437541" y="4760233"/>
-            <a:ext cx="969433" cy="680673"/>
-          </a:xfrm>
-          <a:prstGeom prst="line">
-            <a:avLst/>
-          </a:prstGeom>
-        </p:spPr>
-        <p:style>
-          <a:lnRef idx="1">
-            <a:schemeClr val="accent1"/>
-          </a:lnRef>
-          <a:fillRef idx="0">
-            <a:schemeClr val="accent1"/>
-          </a:fillRef>
-          <a:effectRef idx="0">
-            <a:schemeClr val="accent1"/>
-          </a:effectRef>
-          <a:fontRef idx="minor">
-            <a:schemeClr val="tx1"/>
-          </a:fontRef>
-        </p:style>
-      </p:cxnSp>
-      <p:cxnSp>
-        <p:nvCxnSpPr>
-          <p:cNvPr id="77" name="Straight Connector 76">
-            <a:extLst>
-              <a:ext uri="{FF2B5EF4-FFF2-40B4-BE49-F238E27FC236}">
-                <a16:creationId xmlns:a16="http://schemas.microsoft.com/office/drawing/2014/main" id="{E88BDB54-1589-44C1-AA1D-7FE0831A3B3B}"/>
-              </a:ext>
-            </a:extLst>
-          </p:cNvPr>
-          <p:cNvCxnSpPr>
-            <a:cxnSpLocks/>
-            <a:stCxn id="66" idx="1"/>
-            <a:endCxn id="59" idx="3"/>
-          </p:cNvCxnSpPr>
-          <p:nvPr/>
-        </p:nvCxnSpPr>
-        <p:spPr>
-          <a:xfrm flipH="1" flipV="1">
-            <a:off x="8437541" y="4760233"/>
-            <a:ext cx="969432" cy="1053499"/>
-          </a:xfrm>
-          <a:prstGeom prst="line">
-            <a:avLst/>
-          </a:prstGeom>
-        </p:spPr>
-        <p:style>
-          <a:lnRef idx="1">
-            <a:schemeClr val="accent1"/>
-          </a:lnRef>
-          <a:fillRef idx="0">
-            <a:schemeClr val="accent1"/>
-          </a:fillRef>
-          <a:effectRef idx="0">
-            <a:schemeClr val="accent1"/>
-          </a:effectRef>
-          <a:fontRef idx="minor">
-            <a:schemeClr val="tx1"/>
-          </a:fontRef>
-        </p:style>
-      </p:cxnSp>
-      <p:cxnSp>
-        <p:nvCxnSpPr>
-          <p:cNvPr id="78" name="Straight Connector 77">
-            <a:extLst>
-              <a:ext uri="{FF2B5EF4-FFF2-40B4-BE49-F238E27FC236}">
-                <a16:creationId xmlns:a16="http://schemas.microsoft.com/office/drawing/2014/main" id="{E88BDB54-1589-44C1-AA1D-7FE0831A3B3B}"/>
-              </a:ext>
-            </a:extLst>
-          </p:cNvPr>
-          <p:cNvCxnSpPr>
-            <a:cxnSpLocks/>
-            <a:stCxn id="67" idx="1"/>
-            <a:endCxn id="59" idx="3"/>
-          </p:cNvCxnSpPr>
-          <p:nvPr/>
-        </p:nvCxnSpPr>
-        <p:spPr>
-          <a:xfrm flipH="1" flipV="1">
-            <a:off x="8437541" y="4760233"/>
-            <a:ext cx="969432" cy="1413363"/>
-          </a:xfrm>
-          <a:prstGeom prst="line">
-            <a:avLst/>
-          </a:prstGeom>
-        </p:spPr>
-        <p:style>
-          <a:lnRef idx="1">
-            <a:schemeClr val="accent1"/>
-          </a:lnRef>
-          <a:fillRef idx="0">
-            <a:schemeClr val="accent1"/>
-          </a:fillRef>
-          <a:effectRef idx="0">
-            <a:schemeClr val="accent1"/>
-          </a:effectRef>
-          <a:fontRef idx="minor">
-            <a:schemeClr val="tx1"/>
-          </a:fontRef>
-        </p:style>
-      </p:cxnSp>
-      <p:sp>
-        <p:nvSpPr>
-          <p:cNvPr id="87" name="TextBox 86">
-            <a:extLst>
-              <a:ext uri="{FF2B5EF4-FFF2-40B4-BE49-F238E27FC236}">
-                <a16:creationId xmlns:a16="http://schemas.microsoft.com/office/drawing/2014/main" id="{FA4413A9-DC82-41C1-B62A-BD834DF6C30F}"/>
-              </a:ext>
-            </a:extLst>
-          </p:cNvPr>
-          <p:cNvSpPr txBox="1"/>
-          <p:nvPr/>
-        </p:nvSpPr>
-        <p:spPr>
-          <a:xfrm flipH="1">
-            <a:off x="6245157" y="3165069"/>
-            <a:ext cx="423835" cy="369332"/>
-          </a:xfrm>
-          <a:prstGeom prst="rect">
-            <a:avLst/>
-          </a:prstGeom>
-          <a:noFill/>
-        </p:spPr>
-        <p:txBody>
-          <a:bodyPr wrap="square" rtlCol="0">
-            <a:spAutoFit/>
-          </a:bodyPr>
-          <a:lstStyle/>
-          <a:p>
-            <a:r>
-              <a:rPr lang="en-US" dirty="0"/>
-              <a:t>D</a:t>
+              <a:rPr lang="en-US" sz="1600" dirty="0" smtClean="0"/>
+              <a:t>Lookup table (</a:t>
+            </a:r>
+            <a:r>
+              <a:rPr lang="en-US" sz="1600" dirty="0" err="1" smtClean="0"/>
+              <a:t>dict</a:t>
+            </a:r>
+            <a:r>
+              <a:rPr lang="en-US" sz="1600" dirty="0" smtClean="0"/>
+              <a:t>) that maps </a:t>
+            </a:r>
+            <a:r>
+              <a:rPr lang="en-US" sz="1600" dirty="0" err="1" smtClean="0"/>
+              <a:t>QueryGraph</a:t>
+            </a:r>
+            <a:r>
+              <a:rPr lang="en-US" sz="1600" dirty="0" smtClean="0"/>
+              <a:t> entities to </a:t>
+            </a:r>
+            <a:r>
+              <a:rPr lang="en-US" sz="1600" dirty="0" err="1" smtClean="0"/>
+              <a:t>KnowledgeGraph</a:t>
+            </a:r>
+            <a:r>
+              <a:rPr lang="en-US" sz="1600" dirty="0" smtClean="0"/>
+              <a:t> entities</a:t>
             </a:r>
           </a:p>
         </p:txBody>

</xml_diff>

<commit_message>
Added another implementation slide
</commit_message>
<xml_diff>
--- a/API/0.9.0/ReasonerStdAPI_0.8.0to0.9.0.pptx
+++ b/API/0.9.0/ReasonerStdAPI_0.8.0to0.9.0.pptx
@@ -15,6 +15,7 @@
     <p:sldId id="268" r:id="rId9"/>
     <p:sldId id="276" r:id="rId10"/>
     <p:sldId id="278" r:id="rId11"/>
+    <p:sldId id="280" r:id="rId12"/>
   </p:sldIdLst>
   <p:sldSz cx="12192000" cy="6858000"/>
   <p:notesSz cx="6858000" cy="9144000"/>
@@ -250,7 +251,7 @@
           <a:p>
             <a:fld id="{F6552F34-C226-498A-A7EE-41D35469B7AE}" type="datetimeFigureOut">
               <a:rPr lang="en-US" smtClean="0"/>
-              <a:t>11/14/2018</a:t>
+              <a:t>2/11/2019</a:t>
             </a:fld>
             <a:endParaRPr lang="en-US"/>
           </a:p>
@@ -418,7 +419,7 @@
           <a:p>
             <a:fld id="{F6552F34-C226-498A-A7EE-41D35469B7AE}" type="datetimeFigureOut">
               <a:rPr lang="en-US" smtClean="0"/>
-              <a:t>11/14/2018</a:t>
+              <a:t>2/11/2019</a:t>
             </a:fld>
             <a:endParaRPr lang="en-US"/>
           </a:p>
@@ -596,7 +597,7 @@
           <a:p>
             <a:fld id="{F6552F34-C226-498A-A7EE-41D35469B7AE}" type="datetimeFigureOut">
               <a:rPr lang="en-US" smtClean="0"/>
-              <a:t>11/14/2018</a:t>
+              <a:t>2/11/2019</a:t>
             </a:fld>
             <a:endParaRPr lang="en-US"/>
           </a:p>
@@ -764,7 +765,7 @@
           <a:p>
             <a:fld id="{F6552F34-C226-498A-A7EE-41D35469B7AE}" type="datetimeFigureOut">
               <a:rPr lang="en-US" smtClean="0"/>
-              <a:t>11/14/2018</a:t>
+              <a:t>2/11/2019</a:t>
             </a:fld>
             <a:endParaRPr lang="en-US"/>
           </a:p>
@@ -1009,7 +1010,7 @@
           <a:p>
             <a:fld id="{F6552F34-C226-498A-A7EE-41D35469B7AE}" type="datetimeFigureOut">
               <a:rPr lang="en-US" smtClean="0"/>
-              <a:t>11/14/2018</a:t>
+              <a:t>2/11/2019</a:t>
             </a:fld>
             <a:endParaRPr lang="en-US"/>
           </a:p>
@@ -1238,7 +1239,7 @@
           <a:p>
             <a:fld id="{F6552F34-C226-498A-A7EE-41D35469B7AE}" type="datetimeFigureOut">
               <a:rPr lang="en-US" smtClean="0"/>
-              <a:t>11/14/2018</a:t>
+              <a:t>2/11/2019</a:t>
             </a:fld>
             <a:endParaRPr lang="en-US"/>
           </a:p>
@@ -1602,7 +1603,7 @@
           <a:p>
             <a:fld id="{F6552F34-C226-498A-A7EE-41D35469B7AE}" type="datetimeFigureOut">
               <a:rPr lang="en-US" smtClean="0"/>
-              <a:t>11/14/2018</a:t>
+              <a:t>2/11/2019</a:t>
             </a:fld>
             <a:endParaRPr lang="en-US"/>
           </a:p>
@@ -1719,7 +1720,7 @@
           <a:p>
             <a:fld id="{F6552F34-C226-498A-A7EE-41D35469B7AE}" type="datetimeFigureOut">
               <a:rPr lang="en-US" smtClean="0"/>
-              <a:t>11/14/2018</a:t>
+              <a:t>2/11/2019</a:t>
             </a:fld>
             <a:endParaRPr lang="en-US"/>
           </a:p>
@@ -1814,7 +1815,7 @@
           <a:p>
             <a:fld id="{F6552F34-C226-498A-A7EE-41D35469B7AE}" type="datetimeFigureOut">
               <a:rPr lang="en-US" smtClean="0"/>
-              <a:t>11/14/2018</a:t>
+              <a:t>2/11/2019</a:t>
             </a:fld>
             <a:endParaRPr lang="en-US"/>
           </a:p>
@@ -2089,7 +2090,7 @@
           <a:p>
             <a:fld id="{F6552F34-C226-498A-A7EE-41D35469B7AE}" type="datetimeFigureOut">
               <a:rPr lang="en-US" smtClean="0"/>
-              <a:t>11/14/2018</a:t>
+              <a:t>2/11/2019</a:t>
             </a:fld>
             <a:endParaRPr lang="en-US"/>
           </a:p>
@@ -2341,7 +2342,7 @@
           <a:p>
             <a:fld id="{F6552F34-C226-498A-A7EE-41D35469B7AE}" type="datetimeFigureOut">
               <a:rPr lang="en-US" smtClean="0"/>
-              <a:t>11/14/2018</a:t>
+              <a:t>2/11/2019</a:t>
             </a:fld>
             <a:endParaRPr lang="en-US"/>
           </a:p>
@@ -2552,7 +2553,7 @@
           <a:p>
             <a:fld id="{F6552F34-C226-498A-A7EE-41D35469B7AE}" type="datetimeFigureOut">
               <a:rPr lang="en-US" smtClean="0"/>
-              <a:t>11/14/2018</a:t>
+              <a:t>2/11/2019</a:t>
             </a:fld>
             <a:endParaRPr lang="en-US"/>
           </a:p>
@@ -2999,13 +3000,6 @@
   <p:clrMapOvr>
     <a:masterClrMapping/>
   </p:clrMapOvr>
-  <p:timing>
-    <p:tnLst>
-      <p:par>
-        <p:cTn id="1" dur="indefinite" restart="never" nodeType="tmRoot"/>
-      </p:par>
-    </p:tnLst>
-  </p:timing>
 </p:sld>
 </file>
 
@@ -3069,7 +3063,7 @@
           <a:p>
             <a:pPr algn="ctr"/>
             <a:r>
-              <a:rPr lang="en-US" dirty="0" err="1" smtClean="0"/>
+              <a:rPr lang="en-US" dirty="0" err="1"/>
               <a:t>KnowledgeGraph</a:t>
             </a:r>
             <a:endParaRPr lang="en-US" dirty="0"/>
@@ -6952,16 +6946,12 @@
           <a:lstStyle/>
           <a:p>
             <a:r>
-              <a:rPr lang="en-US" sz="3200" b="1" dirty="0" smtClean="0">
+              <a:rPr lang="en-US" sz="3200" b="1" dirty="0">
                 <a:latin typeface="Arial" panose="020B0604020202020204" pitchFamily="34" charset="0"/>
                 <a:cs typeface="Arial" panose="020B0604020202020204" pitchFamily="34" charset="0"/>
               </a:rPr>
               <a:t>0.9.0</a:t>
             </a:r>
-            <a:endParaRPr lang="en-US" sz="3200" b="1" dirty="0">
-              <a:latin typeface="Arial" panose="020B0604020202020204" pitchFamily="34" charset="0"/>
-              <a:cs typeface="Arial" panose="020B0604020202020204" pitchFamily="34" charset="0"/>
-            </a:endParaRPr>
           </a:p>
         </p:txBody>
       </p:sp>
@@ -7094,10 +7084,9 @@
           <a:lstStyle/>
           <a:p>
             <a:r>
-              <a:rPr lang="en-US" sz="1400" dirty="0" smtClean="0"/>
+              <a:rPr lang="en-US" sz="1400" dirty="0"/>
               <a:t>320</a:t>
             </a:r>
-            <a:endParaRPr lang="en-US" sz="1400" dirty="0"/>
           </a:p>
         </p:txBody>
       </p:sp>
@@ -7146,7 +7135,7 @@
           <a:lstStyle/>
           <a:p>
             <a:r>
-              <a:rPr lang="en-US" dirty="0" err="1" smtClean="0">
+              <a:rPr lang="en-US" dirty="0" err="1">
                 <a:solidFill>
                   <a:srgbClr val="FF0000"/>
                 </a:solidFill>
@@ -7171,13 +7160,286 @@
   <p:clrMapOvr>
     <a:masterClrMapping/>
   </p:clrMapOvr>
-  <p:timing>
-    <p:tnLst>
-      <p:par>
-        <p:cTn id="1" dur="indefinite" restart="never" nodeType="tmRoot"/>
-      </p:par>
-    </p:tnLst>
-  </p:timing>
+</p:sld>
+</file>
+
+<file path=ppt/slides/slide11.xml><?xml version="1.0" encoding="utf-8"?>
+<p:sld xmlns:a="http://schemas.openxmlformats.org/drawingml/2006/main" xmlns:r="http://schemas.openxmlformats.org/officeDocument/2006/relationships" xmlns:p="http://schemas.openxmlformats.org/presentationml/2006/main">
+  <p:cSld>
+    <p:spTree>
+      <p:nvGrpSpPr>
+        <p:cNvPr id="1" name=""/>
+        <p:cNvGrpSpPr/>
+        <p:nvPr/>
+      </p:nvGrpSpPr>
+      <p:grpSpPr>
+        <a:xfrm>
+          <a:off x="0" y="0"/>
+          <a:ext cx="0" cy="0"/>
+          <a:chOff x="0" y="0"/>
+          <a:chExt cx="0" cy="0"/>
+        </a:xfrm>
+      </p:grpSpPr>
+      <p:sp>
+        <p:nvSpPr>
+          <p:cNvPr id="2" name="Title 1">
+            <a:extLst>
+              <a:ext uri="{FF2B5EF4-FFF2-40B4-BE49-F238E27FC236}">
+                <a16:creationId xmlns:a16="http://schemas.microsoft.com/office/drawing/2014/main" id="{595E17AA-3FB3-4FBC-BFE5-82E85429AD81}"/>
+              </a:ext>
+            </a:extLst>
+          </p:cNvPr>
+          <p:cNvSpPr>
+            <a:spLocks noGrp="1"/>
+          </p:cNvSpPr>
+          <p:nvPr>
+            <p:ph type="title"/>
+          </p:nvPr>
+        </p:nvSpPr>
+        <p:spPr/>
+        <p:txBody>
+          <a:bodyPr/>
+          <a:lstStyle/>
+          <a:p>
+            <a:r>
+              <a:rPr lang="en-US" dirty="0"/>
+              <a:t>Implementation notes</a:t>
+            </a:r>
+          </a:p>
+        </p:txBody>
+      </p:sp>
+      <p:sp>
+        <p:nvSpPr>
+          <p:cNvPr id="3" name="Content Placeholder 2">
+            <a:extLst>
+              <a:ext uri="{FF2B5EF4-FFF2-40B4-BE49-F238E27FC236}">
+                <a16:creationId xmlns:a16="http://schemas.microsoft.com/office/drawing/2014/main" id="{89C9909E-4E93-4E32-B7FA-6A423BFD009D}"/>
+              </a:ext>
+            </a:extLst>
+          </p:cNvPr>
+          <p:cNvSpPr>
+            <a:spLocks noGrp="1"/>
+          </p:cNvSpPr>
+          <p:nvPr>
+            <p:ph idx="1"/>
+          </p:nvPr>
+        </p:nvSpPr>
+        <p:spPr>
+          <a:xfrm>
+            <a:off x="1076092" y="2643382"/>
+            <a:ext cx="10515600" cy="3779720"/>
+          </a:xfrm>
+        </p:spPr>
+        <p:txBody>
+          <a:bodyPr>
+            <a:normAutofit/>
+          </a:bodyPr>
+          <a:lstStyle/>
+          <a:p>
+            <a:pPr marL="285750" indent="-285750"/>
+            <a:r>
+              <a:rPr lang="en-US" sz="1800" dirty="0"/>
+              <a:t>The main </a:t>
+            </a:r>
+            <a:r>
+              <a:rPr lang="en-US" sz="1800" b="1" dirty="0">
+                <a:solidFill>
+                  <a:srgbClr val="FF0000"/>
+                </a:solidFill>
+              </a:rPr>
+              <a:t>TranslatorReasonersAPI_0.9.0.yaml</a:t>
+            </a:r>
+            <a:r>
+              <a:rPr lang="en-US" sz="1800" dirty="0"/>
+              <a:t> file is now </a:t>
+            </a:r>
+            <a:r>
+              <a:rPr lang="en-US" sz="1800" dirty="0" err="1"/>
+              <a:t>OpenAPI</a:t>
+            </a:r>
+            <a:r>
+              <a:rPr lang="en-US" sz="1800" dirty="0"/>
+              <a:t> 3.0.1 formatting</a:t>
+            </a:r>
+          </a:p>
+          <a:p>
+            <a:pPr marL="285750" indent="-285750"/>
+            <a:r>
+              <a:rPr lang="en-US" sz="1800" dirty="0"/>
+              <a:t>The secondary </a:t>
+            </a:r>
+            <a:r>
+              <a:rPr lang="en-US" sz="1800" b="1" dirty="0">
+                <a:solidFill>
+                  <a:srgbClr val="FF0000"/>
+                </a:solidFill>
+              </a:rPr>
+              <a:t>TranslatorReasonersAPI_0.9.0_swagger2.0.yaml</a:t>
+            </a:r>
+            <a:r>
+              <a:rPr lang="en-US" sz="1800" dirty="0"/>
+              <a:t> remains on the Swagger 2.0 formatting</a:t>
+            </a:r>
+          </a:p>
+          <a:p>
+            <a:pPr marL="285750" indent="-285750"/>
+            <a:r>
+              <a:rPr lang="en-US" sz="1800" dirty="0"/>
+              <a:t>The Swagger 2.0 formatting is retained for now since some tools do not support </a:t>
+            </a:r>
+            <a:r>
+              <a:rPr lang="en-US" sz="1800" dirty="0" err="1"/>
+              <a:t>OpenAPI</a:t>
+            </a:r>
+            <a:r>
+              <a:rPr lang="en-US" sz="1800" dirty="0"/>
+              <a:t> 3.0.1 yet</a:t>
+            </a:r>
+          </a:p>
+          <a:p>
+            <a:endParaRPr lang="en-US" sz="1800" dirty="0"/>
+          </a:p>
+          <a:p>
+            <a:pPr marL="285750" indent="-285750"/>
+            <a:r>
+              <a:rPr lang="en-US" sz="1800" dirty="0"/>
+              <a:t>Swagger-</a:t>
+            </a:r>
+            <a:r>
+              <a:rPr lang="en-US" sz="1800" dirty="0" err="1"/>
+              <a:t>codegen</a:t>
+            </a:r>
+            <a:r>
+              <a:rPr lang="en-US" sz="1800" dirty="0"/>
+              <a:t> 2.4.x series supports Python-flask and Swagger 2.0, but not </a:t>
+            </a:r>
+            <a:r>
+              <a:rPr lang="en-US" sz="1800" dirty="0" err="1"/>
+              <a:t>OpenAPI</a:t>
+            </a:r>
+            <a:r>
+              <a:rPr lang="en-US" sz="1800" dirty="0"/>
+              <a:t> 3.0.1</a:t>
+            </a:r>
+          </a:p>
+          <a:p>
+            <a:pPr marL="285750" indent="-285750"/>
+            <a:r>
+              <a:rPr lang="en-US" sz="1800" dirty="0"/>
+              <a:t>Swagger-</a:t>
+            </a:r>
+            <a:r>
+              <a:rPr lang="en-US" sz="1800" dirty="0" err="1"/>
+              <a:t>codegen</a:t>
+            </a:r>
+            <a:r>
+              <a:rPr lang="en-US" sz="1800" dirty="0"/>
+              <a:t> 3.0.x series supports </a:t>
+            </a:r>
+            <a:r>
+              <a:rPr lang="en-US" sz="1800" dirty="0" err="1"/>
+              <a:t>OpenAPI</a:t>
+            </a:r>
+            <a:r>
+              <a:rPr lang="en-US" sz="1800" dirty="0"/>
+              <a:t> 3.0.1, but not Python-flask (yet)</a:t>
+            </a:r>
+          </a:p>
+          <a:p>
+            <a:pPr marL="285750" indent="-285750"/>
+            <a:endParaRPr lang="en-US" sz="1800" dirty="0"/>
+          </a:p>
+          <a:p>
+            <a:pPr marL="285750" indent="-285750"/>
+            <a:r>
+              <a:rPr lang="en-US" sz="1800" dirty="0"/>
+              <a:t>RTX is currently using Swagger-</a:t>
+            </a:r>
+            <a:r>
+              <a:rPr lang="en-US" sz="1800" dirty="0" err="1"/>
+              <a:t>codegen</a:t>
+            </a:r>
+            <a:r>
+              <a:rPr lang="en-US" sz="1800" dirty="0"/>
+              <a:t> 2.4.x and TranslatorReasonersAPI_0.9.0.yaml </a:t>
+            </a:r>
+          </a:p>
+          <a:p>
+            <a:pPr marL="285750" indent="-285750"/>
+            <a:endParaRPr lang="en-US" sz="1800" dirty="0"/>
+          </a:p>
+          <a:p>
+            <a:pPr marL="285750" indent="-285750"/>
+            <a:r>
+              <a:rPr lang="en-US" sz="1800" dirty="0" err="1"/>
+              <a:t>Robokop</a:t>
+            </a:r>
+            <a:r>
+              <a:rPr lang="en-US" sz="1800" dirty="0"/>
+              <a:t> is using </a:t>
+            </a:r>
+            <a:r>
+              <a:rPr lang="en-US" sz="1800" dirty="0" err="1"/>
+              <a:t>flasgger</a:t>
+            </a:r>
+            <a:r>
+              <a:rPr lang="en-US" sz="1800" dirty="0"/>
+              <a:t>, which apparently does support </a:t>
+            </a:r>
+            <a:r>
+              <a:rPr lang="en-US" sz="1800" dirty="0" err="1"/>
+              <a:t>OpenAPI</a:t>
+            </a:r>
+            <a:r>
+              <a:rPr lang="en-US" sz="1800" dirty="0"/>
+              <a:t> 3.0.1?</a:t>
+            </a:r>
+          </a:p>
+          <a:p>
+            <a:endParaRPr lang="en-US" sz="1800" dirty="0"/>
+          </a:p>
+        </p:txBody>
+      </p:sp>
+      <p:pic>
+        <p:nvPicPr>
+          <p:cNvPr id="4" name="Picture 3">
+            <a:extLst>
+              <a:ext uri="{FF2B5EF4-FFF2-40B4-BE49-F238E27FC236}">
+                <a16:creationId xmlns:a16="http://schemas.microsoft.com/office/drawing/2014/main" id="{7824E2DB-081C-414F-8DD1-21DE9FD163E9}"/>
+              </a:ext>
+            </a:extLst>
+          </p:cNvPr>
+          <p:cNvPicPr>
+            <a:picLocks noChangeAspect="1"/>
+          </p:cNvPicPr>
+          <p:nvPr/>
+        </p:nvPicPr>
+        <p:blipFill>
+          <a:blip r:embed="rId2"/>
+          <a:stretch>
+            <a:fillRect/>
+          </a:stretch>
+        </p:blipFill>
+        <p:spPr>
+          <a:xfrm>
+            <a:off x="7783552" y="49931"/>
+            <a:ext cx="3169773" cy="2593451"/>
+          </a:xfrm>
+          <a:prstGeom prst="rect">
+            <a:avLst/>
+          </a:prstGeom>
+        </p:spPr>
+      </p:pic>
+    </p:spTree>
+    <p:extLst>
+      <p:ext uri="{BB962C8B-B14F-4D97-AF65-F5344CB8AC3E}">
+        <p14:creationId xmlns:p14="http://schemas.microsoft.com/office/powerpoint/2010/main" val="2075920110"/>
+      </p:ext>
+    </p:extLst>
+  </p:cSld>
+  <p:clrMapOvr>
+    <a:masterClrMapping/>
+  </p:clrMapOvr>
 </p:sld>
 </file>
 
@@ -7236,13 +7498,6 @@
   <p:clrMapOvr>
     <a:masterClrMapping/>
   </p:clrMapOvr>
-  <p:timing>
-    <p:tnLst>
-      <p:par>
-        <p:cTn id="1" dur="indefinite" restart="never" nodeType="tmRoot"/>
-      </p:par>
-    </p:tnLst>
-  </p:timing>
 </p:sld>
 </file>
 
@@ -10960,13 +11215,6 @@
   <p:clrMapOvr>
     <a:masterClrMapping/>
   </p:clrMapOvr>
-  <p:timing>
-    <p:tnLst>
-      <p:par>
-        <p:cTn id="1" dur="indefinite" restart="never" nodeType="tmRoot"/>
-      </p:par>
-    </p:tnLst>
-  </p:timing>
 </p:sld>
 </file>
 
@@ -14941,13 +15189,6 @@
   <p:clrMapOvr>
     <a:masterClrMapping/>
   </p:clrMapOvr>
-  <p:timing>
-    <p:tnLst>
-      <p:par>
-        <p:cTn id="1" dur="indefinite" restart="never" nodeType="tmRoot"/>
-      </p:par>
-    </p:tnLst>
-  </p:timing>
 </p:sld>
 </file>
 
@@ -15085,13 +15326,6 @@
   <p:clrMapOvr>
     <a:masterClrMapping/>
   </p:clrMapOvr>
-  <p:timing>
-    <p:tnLst>
-      <p:par>
-        <p:cTn id="1" dur="indefinite" restart="never" nodeType="tmRoot"/>
-      </p:par>
-    </p:tnLst>
-  </p:timing>
 </p:sld>
 </file>
 
@@ -15533,16 +15767,12 @@
           <a:lstStyle/>
           <a:p>
             <a:r>
-              <a:rPr lang="en-US" sz="3200" b="1" dirty="0" smtClean="0">
+              <a:rPr lang="en-US" sz="3200" b="1" dirty="0">
                 <a:latin typeface="Arial" panose="020B0604020202020204" pitchFamily="34" charset="0"/>
                 <a:cs typeface="Arial" panose="020B0604020202020204" pitchFamily="34" charset="0"/>
               </a:rPr>
               <a:t>0.9.0</a:t>
             </a:r>
-            <a:endParaRPr lang="en-US" sz="3200" b="1" dirty="0">
-              <a:latin typeface="Arial" panose="020B0604020202020204" pitchFamily="34" charset="0"/>
-              <a:cs typeface="Arial" panose="020B0604020202020204" pitchFamily="34" charset="0"/>
-            </a:endParaRPr>
           </a:p>
         </p:txBody>
       </p:sp>
@@ -17034,7 +17264,7 @@
           <a:p>
             <a:pPr algn="ctr"/>
             <a:r>
-              <a:rPr lang="en-US" dirty="0" err="1" smtClean="0"/>
+              <a:rPr lang="en-US" dirty="0" err="1"/>
               <a:t>PreviousMessageProcessingPlan</a:t>
             </a:r>
             <a:endParaRPr lang="en-US" dirty="0"/>
@@ -17091,13 +17321,6 @@
   <p:clrMapOvr>
     <a:masterClrMapping/>
   </p:clrMapOvr>
-  <p:timing>
-    <p:tnLst>
-      <p:par>
-        <p:cTn id="1" dur="indefinite" restart="never" nodeType="tmRoot"/>
-      </p:par>
-    </p:tnLst>
-  </p:timing>
 </p:sld>
 </file>
 
@@ -18075,7 +18298,7 @@
           <a:lstStyle/>
           <a:p>
             <a:r>
-              <a:rPr lang="en-US" dirty="0" err="1" smtClean="0">
+              <a:rPr lang="en-US" dirty="0" err="1">
                 <a:solidFill>
                   <a:srgbClr val="FF0000"/>
                 </a:solidFill>
@@ -18083,7 +18306,7 @@
               <a:t>message</a:t>
             </a:r>
             <a:r>
-              <a:rPr lang="en-US" dirty="0" err="1" smtClean="0"/>
+              <a:rPr lang="en-US" dirty="0" err="1"/>
               <a:t>_code</a:t>
             </a:r>
             <a:endParaRPr lang="en-US" dirty="0"/>
@@ -19349,16 +19572,12 @@
           <a:lstStyle/>
           <a:p>
             <a:r>
-              <a:rPr lang="en-US" sz="3200" b="1" dirty="0" smtClean="0">
+              <a:rPr lang="en-US" sz="3200" b="1" dirty="0">
                 <a:latin typeface="Arial" panose="020B0604020202020204" pitchFamily="34" charset="0"/>
                 <a:cs typeface="Arial" panose="020B0604020202020204" pitchFamily="34" charset="0"/>
               </a:rPr>
               <a:t>0.9.0</a:t>
             </a:r>
-            <a:endParaRPr lang="en-US" sz="3200" b="1" dirty="0">
-              <a:latin typeface="Arial" panose="020B0604020202020204" pitchFamily="34" charset="0"/>
-              <a:cs typeface="Arial" panose="020B0604020202020204" pitchFamily="34" charset="0"/>
-            </a:endParaRPr>
           </a:p>
         </p:txBody>
       </p:sp>
@@ -20097,10 +20316,9 @@
           <a:lstStyle/>
           <a:p>
             <a:r>
-              <a:rPr lang="en-US" dirty="0" smtClean="0"/>
+              <a:rPr lang="en-US" dirty="0"/>
               <a:t>context</a:t>
             </a:r>
-            <a:endParaRPr lang="en-US" dirty="0"/>
           </a:p>
         </p:txBody>
       </p:sp>
@@ -20149,10 +20367,9 @@
           <a:lstStyle/>
           <a:p>
             <a:r>
-              <a:rPr lang="en-US" dirty="0" smtClean="0"/>
+              <a:rPr lang="en-US" dirty="0"/>
               <a:t>type</a:t>
             </a:r>
-            <a:endParaRPr lang="en-US" dirty="0"/>
           </a:p>
         </p:txBody>
       </p:sp>
@@ -20244,13 +20461,6 @@
   <p:clrMapOvr>
     <a:masterClrMapping/>
   </p:clrMapOvr>
-  <p:timing>
-    <p:tnLst>
-      <p:par>
-        <p:cTn id="1" dur="indefinite" restart="never" nodeType="tmRoot"/>
-      </p:par>
-    </p:tnLst>
-  </p:timing>
 </p:sld>
 </file>
 
@@ -20314,7 +20524,7 @@
           <a:p>
             <a:pPr algn="ctr"/>
             <a:r>
-              <a:rPr lang="en-US" dirty="0" err="1" smtClean="0"/>
+              <a:rPr lang="en-US" dirty="0" err="1"/>
               <a:t>QueryGraph</a:t>
             </a:r>
             <a:endParaRPr lang="en-US" dirty="0"/>
@@ -20350,16 +20560,12 @@
           <a:lstStyle/>
           <a:p>
             <a:r>
-              <a:rPr lang="en-US" sz="3200" b="1" dirty="0" smtClean="0">
+              <a:rPr lang="en-US" sz="3200" b="1" dirty="0">
                 <a:latin typeface="Arial" panose="020B0604020202020204" pitchFamily="34" charset="0"/>
                 <a:cs typeface="Arial" panose="020B0604020202020204" pitchFamily="34" charset="0"/>
               </a:rPr>
               <a:t>0.9.0</a:t>
             </a:r>
-            <a:endParaRPr lang="en-US" sz="3200" b="1" dirty="0">
-              <a:latin typeface="Arial" panose="020B0604020202020204" pitchFamily="34" charset="0"/>
-              <a:cs typeface="Arial" panose="020B0604020202020204" pitchFamily="34" charset="0"/>
-            </a:endParaRPr>
           </a:p>
         </p:txBody>
       </p:sp>
@@ -22086,13 +22292,6 @@
   <p:clrMapOvr>
     <a:masterClrMapping/>
   </p:clrMapOvr>
-  <p:timing>
-    <p:tnLst>
-      <p:par>
-        <p:cTn id="1" dur="indefinite" restart="never" nodeType="tmRoot"/>
-      </p:par>
-    </p:tnLst>
-  </p:timing>
 </p:sld>
 </file>
 
@@ -23275,16 +23474,12 @@
           <a:lstStyle/>
           <a:p>
             <a:r>
-              <a:rPr lang="en-US" sz="3200" b="1" dirty="0" smtClean="0">
+              <a:rPr lang="en-US" sz="3200" b="1" dirty="0">
                 <a:latin typeface="Arial" panose="020B0604020202020204" pitchFamily="34" charset="0"/>
                 <a:cs typeface="Arial" panose="020B0604020202020204" pitchFamily="34" charset="0"/>
               </a:rPr>
               <a:t>0.9.0</a:t>
             </a:r>
-            <a:endParaRPr lang="en-US" sz="3200" b="1" dirty="0">
-              <a:latin typeface="Arial" panose="020B0604020202020204" pitchFamily="34" charset="0"/>
-              <a:cs typeface="Arial" panose="020B0604020202020204" pitchFamily="34" charset="0"/>
-            </a:endParaRPr>
           </a:p>
         </p:txBody>
       </p:sp>
@@ -23330,15 +23525,7 @@
             </a:r>
             <a:r>
               <a:rPr lang="en-US" sz="1200" dirty="0"/>
-              <a:t>(but can be </a:t>
-            </a:r>
-            <a:r>
-              <a:rPr lang="en-US" sz="1200" dirty="0" smtClean="0"/>
-              <a:t>limited </a:t>
-            </a:r>
-            <a:r>
-              <a:rPr lang="en-US" sz="1200" dirty="0"/>
-              <a:t>to just ids)</a:t>
+              <a:t>(but can be limited to just ids)</a:t>
             </a:r>
           </a:p>
         </p:txBody>
@@ -24087,7 +24274,7 @@
           <a:lstStyle/>
           <a:p>
             <a:r>
-              <a:rPr lang="en-US" dirty="0" err="1" smtClean="0"/>
+              <a:rPr lang="en-US" dirty="0" err="1"/>
               <a:t>QEdge.edge_id</a:t>
             </a:r>
             <a:endParaRPr lang="en-US" dirty="0"/>
@@ -24304,10 +24491,9 @@
           <a:lstStyle/>
           <a:p>
             <a:r>
-              <a:rPr lang="en-US" sz="1400" dirty="0" smtClean="0"/>
+              <a:rPr lang="en-US" sz="1400" dirty="0"/>
               <a:t>320</a:t>
             </a:r>
-            <a:endParaRPr lang="en-US" sz="1400" dirty="0"/>
           </a:p>
         </p:txBody>
       </p:sp>
@@ -24663,10 +24849,9 @@
           <a:lstStyle/>
           <a:p>
             <a:r>
-              <a:rPr lang="en-US" sz="1400" dirty="0" smtClean="0"/>
+              <a:rPr lang="en-US" sz="1400" dirty="0"/>
               <a:t>n01</a:t>
             </a:r>
-            <a:endParaRPr lang="en-US" sz="1400" dirty="0"/>
           </a:p>
         </p:txBody>
       </p:sp>
@@ -24865,7 +25050,7 @@
           <a:lstStyle/>
           <a:p>
             <a:r>
-              <a:rPr lang="en-US" dirty="0" err="1" smtClean="0"/>
+              <a:rPr lang="en-US" dirty="0" err="1"/>
               <a:t>QEdge.edge_id</a:t>
             </a:r>
             <a:endParaRPr lang="en-US" dirty="0"/>
@@ -25043,10 +25228,9 @@
           <a:lstStyle/>
           <a:p>
             <a:r>
-              <a:rPr lang="en-US" sz="1400" dirty="0" smtClean="0"/>
+              <a:rPr lang="en-US" sz="1400" dirty="0"/>
               <a:t>837</a:t>
             </a:r>
-            <a:endParaRPr lang="en-US" sz="1400" dirty="0"/>
           </a:p>
         </p:txBody>
       </p:sp>
@@ -25079,10 +25263,9 @@
           <a:lstStyle/>
           <a:p>
             <a:r>
-              <a:rPr lang="en-US" sz="1400" dirty="0" smtClean="0"/>
+              <a:rPr lang="en-US" sz="1400" dirty="0"/>
               <a:t>e01</a:t>
             </a:r>
-            <a:endParaRPr lang="en-US" sz="1400" dirty="0"/>
           </a:p>
         </p:txBody>
       </p:sp>
@@ -25115,10 +25298,9 @@
           <a:lstStyle/>
           <a:p>
             <a:r>
-              <a:rPr lang="en-US" sz="1400" dirty="0" smtClean="0"/>
+              <a:rPr lang="en-US" sz="1400" dirty="0"/>
               <a:t>n02</a:t>
             </a:r>
-            <a:endParaRPr lang="en-US" sz="1400" dirty="0"/>
           </a:p>
         </p:txBody>
       </p:sp>
@@ -25151,31 +25333,31 @@
           <a:lstStyle/>
           <a:p>
             <a:r>
-              <a:rPr lang="en-US" sz="1600" dirty="0" smtClean="0"/>
+              <a:rPr lang="en-US" sz="1600" dirty="0"/>
               <a:t>Lookup table (</a:t>
             </a:r>
             <a:r>
-              <a:rPr lang="en-US" sz="1600" dirty="0" err="1" smtClean="0"/>
+              <a:rPr lang="en-US" sz="1600" dirty="0" err="1"/>
               <a:t>dict</a:t>
             </a:r>
             <a:r>
-              <a:rPr lang="en-US" sz="1600" dirty="0" smtClean="0"/>
+              <a:rPr lang="en-US" sz="1600" dirty="0"/>
               <a:t>) that maps </a:t>
             </a:r>
             <a:r>
-              <a:rPr lang="en-US" sz="1600" dirty="0" err="1" smtClean="0"/>
+              <a:rPr lang="en-US" sz="1600" dirty="0" err="1"/>
               <a:t>QueryGraph</a:t>
             </a:r>
             <a:r>
-              <a:rPr lang="en-US" sz="1600" dirty="0" smtClean="0"/>
+              <a:rPr lang="en-US" sz="1600" dirty="0"/>
               <a:t> entities to </a:t>
             </a:r>
             <a:r>
-              <a:rPr lang="en-US" sz="1600" dirty="0" err="1" smtClean="0"/>
+              <a:rPr lang="en-US" sz="1600" dirty="0" err="1"/>
               <a:t>KnowledgeGraph</a:t>
             </a:r>
             <a:r>
-              <a:rPr lang="en-US" sz="1600" dirty="0" smtClean="0"/>
+              <a:rPr lang="en-US" sz="1600" dirty="0"/>
               <a:t> entities</a:t>
             </a:r>
           </a:p>
@@ -25191,13 +25373,6 @@
   <p:clrMapOvr>
     <a:masterClrMapping/>
   </p:clrMapOvr>
-  <p:timing>
-    <p:tnLst>
-      <p:par>
-        <p:cTn id="1" dur="indefinite" restart="never" nodeType="tmRoot"/>
-      </p:par>
-    </p:tnLst>
-  </p:timing>
 </p:sld>
 </file>
 

</xml_diff>